<commit_message>
small changes including james'
</commit_message>
<xml_diff>
--- a/A Team Documents/Interim presentation.pptx
+++ b/A Team Documents/Interim presentation.pptx
@@ -5,10 +5,10 @@
     <p:sldMasterId id="2147483732" r:id="rId1"/>
   </p:sldMasterIdLst>
   <p:notesMasterIdLst>
-    <p:notesMasterId r:id="rId18"/>
+    <p:notesMasterId r:id="rId21"/>
   </p:notesMasterIdLst>
   <p:handoutMasterIdLst>
-    <p:handoutMasterId r:id="rId19"/>
+    <p:handoutMasterId r:id="rId22"/>
   </p:handoutMasterIdLst>
   <p:sldIdLst>
     <p:sldId id="288" r:id="rId2"/>
@@ -21,12 +21,15 @@
     <p:sldId id="301" r:id="rId9"/>
     <p:sldId id="302" r:id="rId10"/>
     <p:sldId id="303" r:id="rId11"/>
-    <p:sldId id="304" r:id="rId12"/>
-    <p:sldId id="306" r:id="rId13"/>
-    <p:sldId id="305" r:id="rId14"/>
-    <p:sldId id="307" r:id="rId15"/>
-    <p:sldId id="308" r:id="rId16"/>
-    <p:sldId id="295" r:id="rId17"/>
+    <p:sldId id="310" r:id="rId12"/>
+    <p:sldId id="311" r:id="rId13"/>
+    <p:sldId id="312" r:id="rId14"/>
+    <p:sldId id="304" r:id="rId15"/>
+    <p:sldId id="306" r:id="rId16"/>
+    <p:sldId id="305" r:id="rId17"/>
+    <p:sldId id="307" r:id="rId18"/>
+    <p:sldId id="308" r:id="rId19"/>
+    <p:sldId id="295" r:id="rId20"/>
   </p:sldIdLst>
   <p:sldSz cx="9144000" cy="6858000" type="screen4x3"/>
   <p:notesSz cx="6858000" cy="9144000"/>
@@ -211,7 +214,7 @@
             <a:fld id="{59E2BC62-7E84-44FB-9A81-3B8AD9AE521B}" type="datetimeFigureOut">
               <a:rPr lang="en-US" smtClean="0"/>
               <a:pPr/>
-              <a:t>3/9/2015</a:t>
+              <a:t>3/10/2015</a:t>
             </a:fld>
             <a:endParaRPr lang="en-US"/>
           </a:p>
@@ -373,7 +376,7 @@
             <a:fld id="{AC4D07E4-89AF-44D2-9F2F-5F6D2623599A}" type="datetimeFigureOut">
               <a:rPr lang="en-US" smtClean="0"/>
               <a:pPr/>
-              <a:t>3/9/2015</a:t>
+              <a:t>3/10/2015</a:t>
             </a:fld>
             <a:endParaRPr lang="en-US"/>
           </a:p>
@@ -1204,7 +1207,7 @@
             <a:fld id="{461E6A8B-52D2-4FB9-BB2D-A053F589DABE}" type="datetimeFigureOut">
               <a:rPr lang="en-US" smtClean="0"/>
               <a:pPr/>
-              <a:t>3/9/2015</a:t>
+              <a:t>3/10/2015</a:t>
             </a:fld>
             <a:endParaRPr lang="en-US" dirty="0"/>
           </a:p>
@@ -1371,7 +1374,7 @@
             <a:fld id="{461E6A8B-52D2-4FB9-BB2D-A053F589DABE}" type="datetimeFigureOut">
               <a:rPr lang="en-US" smtClean="0"/>
               <a:pPr/>
-              <a:t>3/9/2015</a:t>
+              <a:t>3/10/2015</a:t>
             </a:fld>
             <a:endParaRPr lang="en-US"/>
           </a:p>
@@ -1548,7 +1551,7 @@
             <a:fld id="{461E6A8B-52D2-4FB9-BB2D-A053F589DABE}" type="datetimeFigureOut">
               <a:rPr lang="en-US" smtClean="0"/>
               <a:pPr/>
-              <a:t>3/9/2015</a:t>
+              <a:t>3/10/2015</a:t>
             </a:fld>
             <a:endParaRPr lang="en-US"/>
           </a:p>
@@ -1715,7 +1718,7 @@
             <a:fld id="{461E6A8B-52D2-4FB9-BB2D-A053F589DABE}" type="datetimeFigureOut">
               <a:rPr lang="en-US" smtClean="0"/>
               <a:pPr/>
-              <a:t>3/9/2015</a:t>
+              <a:t>3/10/2015</a:t>
             </a:fld>
             <a:endParaRPr lang="en-US"/>
           </a:p>
@@ -1958,7 +1961,7 @@
             <a:fld id="{461E6A8B-52D2-4FB9-BB2D-A053F589DABE}" type="datetimeFigureOut">
               <a:rPr lang="en-US" smtClean="0"/>
               <a:pPr/>
-              <a:t>3/9/2015</a:t>
+              <a:t>3/10/2015</a:t>
             </a:fld>
             <a:endParaRPr lang="en-US"/>
           </a:p>
@@ -2243,7 +2246,7 @@
             <a:fld id="{461E6A8B-52D2-4FB9-BB2D-A053F589DABE}" type="datetimeFigureOut">
               <a:rPr lang="en-US" smtClean="0"/>
               <a:pPr/>
-              <a:t>3/9/2015</a:t>
+              <a:t>3/10/2015</a:t>
             </a:fld>
             <a:endParaRPr lang="en-US"/>
           </a:p>
@@ -2662,7 +2665,7 @@
             <a:fld id="{461E6A8B-52D2-4FB9-BB2D-A053F589DABE}" type="datetimeFigureOut">
               <a:rPr lang="en-US" smtClean="0"/>
               <a:pPr/>
-              <a:t>3/9/2015</a:t>
+              <a:t>3/10/2015</a:t>
             </a:fld>
             <a:endParaRPr lang="en-US"/>
           </a:p>
@@ -2777,7 +2780,7 @@
             <a:fld id="{461E6A8B-52D2-4FB9-BB2D-A053F589DABE}" type="datetimeFigureOut">
               <a:rPr lang="en-US" smtClean="0"/>
               <a:pPr/>
-              <a:t>3/9/2015</a:t>
+              <a:t>3/10/2015</a:t>
             </a:fld>
             <a:endParaRPr lang="en-US"/>
           </a:p>
@@ -2869,7 +2872,7 @@
             <a:fld id="{461E6A8B-52D2-4FB9-BB2D-A053F589DABE}" type="datetimeFigureOut">
               <a:rPr lang="en-US" smtClean="0"/>
               <a:pPr/>
-              <a:t>3/9/2015</a:t>
+              <a:t>3/10/2015</a:t>
             </a:fld>
             <a:endParaRPr lang="en-US"/>
           </a:p>
@@ -3143,7 +3146,7 @@
             <a:fld id="{461E6A8B-52D2-4FB9-BB2D-A053F589DABE}" type="datetimeFigureOut">
               <a:rPr lang="en-US" smtClean="0"/>
               <a:pPr/>
-              <a:t>3/9/2015</a:t>
+              <a:t>3/10/2015</a:t>
             </a:fld>
             <a:endParaRPr lang="en-US"/>
           </a:p>
@@ -3393,7 +3396,7 @@
             <a:fld id="{461E6A8B-52D2-4FB9-BB2D-A053F589DABE}" type="datetimeFigureOut">
               <a:rPr lang="en-US" smtClean="0"/>
               <a:pPr/>
-              <a:t>3/9/2015</a:t>
+              <a:t>3/10/2015</a:t>
             </a:fld>
             <a:endParaRPr lang="en-US"/>
           </a:p>
@@ -3621,7 +3624,7 @@
             <a:fld id="{461E6A8B-52D2-4FB9-BB2D-A053F589DABE}" type="datetimeFigureOut">
               <a:rPr lang="en-US" smtClean="0"/>
               <a:pPr/>
-              <a:t>3/9/2015</a:t>
+              <a:t>3/10/2015</a:t>
             </a:fld>
             <a:endParaRPr lang="en-US"/>
           </a:p>
@@ -4042,7 +4045,7 @@
         </p:nvSpPr>
         <p:spPr>
           <a:xfrm>
-            <a:off x="0" y="838200"/>
+            <a:off x="152400" y="914400"/>
             <a:ext cx="5943600" cy="1470025"/>
           </a:xfrm>
         </p:spPr>
@@ -4100,11 +4103,6 @@
               </a:rPr>
               <a:t>Sanan Aamir, Romando Garcia, </a:t>
             </a:r>
-            <a:endParaRPr lang="en-US" sz="2800" b="1" dirty="0" smtClean="0">
-              <a:solidFill>
-                <a:srgbClr val="305CD8"/>
-              </a:solidFill>
-            </a:endParaRPr>
           </a:p>
           <a:p>
             <a:r>
@@ -4113,23 +4111,7 @@
                   <a:srgbClr val="305CD8"/>
                 </a:solidFill>
               </a:rPr>
-              <a:t>Anne </a:t>
-            </a:r>
-            <a:r>
-              <a:rPr lang="en-US" sz="2800" b="1" dirty="0" smtClean="0">
-                <a:solidFill>
-                  <a:srgbClr val="305CD8"/>
-                </a:solidFill>
-              </a:rPr>
-              <a:t>Lam, James Rowe, Hieu </a:t>
-            </a:r>
-            <a:r>
-              <a:rPr lang="en-US" sz="2800" b="1" dirty="0" smtClean="0">
-                <a:solidFill>
-                  <a:srgbClr val="305CD8"/>
-                </a:solidFill>
-              </a:rPr>
-              <a:t>Tran</a:t>
+              <a:t>Anne Lam, James Rowe, Hieu Tran</a:t>
             </a:r>
           </a:p>
           <a:p>
@@ -4147,14 +4129,6 @@
               </a:rPr>
               <a:t>Interim Presentation</a:t>
             </a:r>
-            <a:endParaRPr lang="en-US" sz="2800" b="1" dirty="0" smtClean="0">
-              <a:solidFill>
-                <a:schemeClr val="tx1">
-                  <a:lumMod val="65000"/>
-                  <a:lumOff val="35000"/>
-                </a:schemeClr>
-              </a:solidFill>
-            </a:endParaRPr>
           </a:p>
           <a:p>
             <a:r>
@@ -4179,9 +4153,69 @@
           </a:p>
         </p:txBody>
       </p:sp>
+      <p:sp>
+        <p:nvSpPr>
+          <p:cNvPr id="20482" name="AutoShape 2" descr="Displaying TheATeam.png"/>
+          <p:cNvSpPr>
+            <a:spLocks noChangeAspect="1" noChangeArrowheads="1"/>
+          </p:cNvSpPr>
+          <p:nvPr/>
+        </p:nvSpPr>
+        <p:spPr bwMode="auto">
+          <a:xfrm>
+            <a:off x="155575" y="-144463"/>
+            <a:ext cx="304800" cy="304801"/>
+          </a:xfrm>
+          <a:prstGeom prst="rect">
+            <a:avLst/>
+          </a:prstGeom>
+          <a:noFill/>
+        </p:spPr>
+        <p:txBody>
+          <a:bodyPr vert="horz" wrap="square" lIns="91440" tIns="45720" rIns="91440" bIns="45720" numCol="1" anchor="t" anchorCtr="0" compatLnSpc="1">
+            <a:prstTxWarp prst="textNoShape">
+              <a:avLst/>
+            </a:prstTxWarp>
+          </a:bodyPr>
+          <a:lstStyle/>
+          <a:p>
+            <a:endParaRPr lang="en-US"/>
+          </a:p>
+        </p:txBody>
+      </p:sp>
+      <p:sp>
+        <p:nvSpPr>
+          <p:cNvPr id="20484" name="AutoShape 4" descr="Displaying TheATeam.png"/>
+          <p:cNvSpPr>
+            <a:spLocks noChangeAspect="1" noChangeArrowheads="1"/>
+          </p:cNvSpPr>
+          <p:nvPr/>
+        </p:nvSpPr>
+        <p:spPr bwMode="auto">
+          <a:xfrm>
+            <a:off x="155575" y="-144463"/>
+            <a:ext cx="304800" cy="304801"/>
+          </a:xfrm>
+          <a:prstGeom prst="rect">
+            <a:avLst/>
+          </a:prstGeom>
+          <a:noFill/>
+        </p:spPr>
+        <p:txBody>
+          <a:bodyPr vert="horz" wrap="square" lIns="91440" tIns="45720" rIns="91440" bIns="45720" numCol="1" anchor="t" anchorCtr="0" compatLnSpc="1">
+            <a:prstTxWarp prst="textNoShape">
+              <a:avLst/>
+            </a:prstTxWarp>
+          </a:bodyPr>
+          <a:lstStyle/>
+          <a:p>
+            <a:endParaRPr lang="en-US"/>
+          </a:p>
+        </p:txBody>
+      </p:sp>
       <p:pic>
         <p:nvPicPr>
-          <p:cNvPr id="1026" name="Picture 2" descr="C:\Users\Anne\Desktop\teAmLogo.png"/>
+          <p:cNvPr id="20485" name="Picture 5" descr="C:\Users\Anne\Desktop\TheATeam.png"/>
           <p:cNvPicPr>
             <a:picLocks noChangeAspect="1" noChangeArrowheads="1"/>
           </p:cNvPicPr>
@@ -4196,8 +4230,8 @@
         </p:blipFill>
         <p:spPr bwMode="auto">
           <a:xfrm>
-            <a:off x="6019800" y="533400"/>
-            <a:ext cx="2590800" cy="2590800"/>
+            <a:off x="5791200" y="609600"/>
+            <a:ext cx="2587625" cy="2587625"/>
           </a:xfrm>
           <a:prstGeom prst="rect">
             <a:avLst/>
@@ -4291,15 +4325,7 @@
           <a:p>
             <a:r>
               <a:rPr lang="en-US" dirty="0" smtClean="0"/>
-              <a:t>All </a:t>
-            </a:r>
-            <a:r>
-              <a:rPr lang="en-US" dirty="0" smtClean="0"/>
-              <a:t>members contribute to documentation via primary authoring or </a:t>
-            </a:r>
-            <a:r>
-              <a:rPr lang="en-US" dirty="0" smtClean="0"/>
-              <a:t>editing</a:t>
+              <a:t>All members contribute to documentation via primary authoring or editing</a:t>
             </a:r>
           </a:p>
           <a:p>
@@ -4309,56 +4335,44 @@
             </a:r>
             <a:r>
               <a:rPr lang="en-US" dirty="0" smtClean="0"/>
-              <a:t> split </a:t>
+              <a:t>split </a:t>
             </a:r>
             <a:r>
               <a:rPr lang="en-US" dirty="0" smtClean="0"/>
               <a:t>based on functionality, </a:t>
             </a:r>
+          </a:p>
+          <a:p>
+            <a:pPr lvl="1"/>
+            <a:r>
+              <a:rPr lang="en-US" dirty="0" smtClean="0"/>
+              <a:t>T</a:t>
+            </a:r>
+            <a:r>
+              <a:rPr lang="en-US" dirty="0" smtClean="0"/>
+              <a:t>wo </a:t>
+            </a:r>
+            <a:r>
+              <a:rPr lang="en-US" dirty="0" smtClean="0"/>
+              <a:t>pairs of partners focusing on a set of </a:t>
+            </a:r>
+            <a:r>
+              <a:rPr lang="en-US" dirty="0" smtClean="0"/>
+              <a:t>features</a:t>
+            </a:r>
             <a:endParaRPr lang="en-US" dirty="0" smtClean="0"/>
           </a:p>
           <a:p>
             <a:pPr lvl="1"/>
             <a:r>
               <a:rPr lang="en-US" dirty="0" smtClean="0"/>
-              <a:t>two </a:t>
-            </a:r>
-            <a:r>
-              <a:rPr lang="en-US" dirty="0" smtClean="0"/>
-              <a:t>pairs of partners focusing on a </a:t>
-            </a:r>
-            <a:r>
-              <a:rPr lang="en-US" dirty="0" smtClean="0"/>
-              <a:t>set </a:t>
-            </a:r>
-            <a:r>
-              <a:rPr lang="en-US" dirty="0" smtClean="0"/>
-              <a:t>of features</a:t>
-            </a:r>
-            <a:r>
-              <a:rPr lang="en-US" dirty="0" smtClean="0"/>
-              <a:t>.</a:t>
-            </a:r>
-          </a:p>
-          <a:p>
-            <a:pPr lvl="1"/>
-            <a:r>
-              <a:rPr lang="en-US" dirty="0" smtClean="0"/>
-              <a:t>James/Romando Garcia and Anne Lam/Sanan </a:t>
-            </a:r>
-            <a:r>
-              <a:rPr lang="en-US" dirty="0" smtClean="0"/>
-              <a:t>Aamir</a:t>
-            </a:r>
-          </a:p>
-          <a:p>
-            <a:r>
-              <a:rPr lang="en-US" dirty="0" smtClean="0"/>
-              <a:t>Hieu Tran - testing </a:t>
-            </a:r>
-            <a:r>
-              <a:rPr lang="en-US" dirty="0" smtClean="0"/>
-              <a:t>and documentation</a:t>
+              <a:t>James/Romando Garcia and Anne Lam/Sanan Aamir</a:t>
+            </a:r>
+          </a:p>
+          <a:p>
+            <a:r>
+              <a:rPr lang="en-US" dirty="0" smtClean="0"/>
+              <a:t>Hieu Tran - testing and documentation</a:t>
             </a:r>
             <a:endParaRPr lang="en-US" dirty="0"/>
           </a:p>
@@ -4369,6 +4383,13 @@
   <p:clrMapOvr>
     <a:masterClrMapping/>
   </p:clrMapOvr>
+  <p:timing>
+    <p:tnLst>
+      <p:par>
+        <p:cTn id="1" dur="indefinite" restart="never" nodeType="tmRoot"/>
+      </p:par>
+    </p:tnLst>
+  </p:timing>
 </p:sld>
 </file>
 
@@ -4406,6 +4427,381 @@
           <a:p>
             <a:r>
               <a:rPr lang="en-US" dirty="0" smtClean="0"/>
+              <a:t>Additional Plan Details</a:t>
+            </a:r>
+            <a:endParaRPr lang="en-US" dirty="0"/>
+          </a:p>
+        </p:txBody>
+      </p:sp>
+      <p:sp>
+        <p:nvSpPr>
+          <p:cNvPr id="3" name="Content Placeholder 2"/>
+          <p:cNvSpPr>
+            <a:spLocks noGrp="1"/>
+          </p:cNvSpPr>
+          <p:nvPr>
+            <p:ph sz="half" idx="1"/>
+          </p:nvPr>
+        </p:nvSpPr>
+        <p:spPr>
+          <a:xfrm>
+            <a:off x="457200" y="1600200"/>
+            <a:ext cx="3352800" cy="4525963"/>
+          </a:xfrm>
+        </p:spPr>
+        <p:txBody>
+          <a:bodyPr/>
+          <a:lstStyle/>
+          <a:p>
+            <a:r>
+              <a:rPr lang="en-US" dirty="0" smtClean="0"/>
+              <a:t>Visual Studio &amp; C#</a:t>
+            </a:r>
+          </a:p>
+          <a:p>
+            <a:r>
+              <a:rPr lang="en-US" dirty="0" err="1" smtClean="0"/>
+              <a:t>Github</a:t>
+            </a:r>
+            <a:r>
+              <a:rPr lang="en-US" dirty="0" smtClean="0"/>
+              <a:t> for Version Control and Project Storage</a:t>
+            </a:r>
+          </a:p>
+          <a:p>
+            <a:r>
+              <a:rPr lang="en-US" dirty="0" smtClean="0"/>
+              <a:t>Communicate often, formal meetings weekly</a:t>
+            </a:r>
+            <a:endParaRPr lang="en-US" dirty="0"/>
+          </a:p>
+        </p:txBody>
+      </p:sp>
+      <p:pic>
+        <p:nvPicPr>
+          <p:cNvPr id="5" name="Content Placeholder 4" descr="Macintosh HD:Users:watdahieu:Dropbox:Gant.png"/>
+          <p:cNvPicPr>
+            <a:picLocks noGrp="1"/>
+          </p:cNvPicPr>
+          <p:nvPr>
+            <p:ph sz="half" idx="2"/>
+          </p:nvPr>
+        </p:nvPicPr>
+        <p:blipFill>
+          <a:blip r:embed="rId2" cstate="print">
+            <a:extLst>
+              <a:ext uri="{28A0092B-C50C-407E-A947-70E740481C1C}">
+                <a14:useLocalDpi xmlns="" xmlns:wpc="http://schemas.microsoft.com/office/word/2010/wordprocessingCanvas" xmlns:mo="http://schemas.microsoft.com/office/mac/office/2008/main" xmlns:mc="http://schemas.openxmlformats.org/markup-compatibility/2006" xmlns:mv="urn:schemas-microsoft-com:mac:vml" xmlns:o="urn:schemas-microsoft-com:office:office" xmlns:m="http://schemas.openxmlformats.org/officeDocument/2006/math" xmlns:v="urn:schemas-microsoft-com:vml" xmlns:wp14="http://schemas.microsoft.com/office/word/2010/wordprocessingDrawing" xmlns:wp="http://schemas.openxmlformats.org/drawingml/2006/wordprocessingDrawing" xmlns:w10="urn:schemas-microsoft-com:office:word" xmlns:w="http://schemas.openxmlformats.org/wordprocessingml/2006/main" xmlns:w14="http://schemas.microsoft.com/office/word/2010/wordml" xmlns:wpg="http://schemas.microsoft.com/office/word/2010/wordprocessingGroup" xmlns:wpi="http://schemas.microsoft.com/office/word/2010/wordprocessingInk" xmlns:wne="http://schemas.microsoft.com/office/word/2006/wordml" xmlns:wps="http://schemas.microsoft.com/office/word/2010/wordprocessingShape" xmlns:a14="http://schemas.microsoft.com/office/drawing/2010/main" xmlns:pic="http://schemas.openxmlformats.org/drawingml/2006/picture" xmlns:lc="http://schemas.openxmlformats.org/drawingml/2006/lockedCanvas" val="0"/>
+              </a:ext>
+            </a:extLst>
+          </a:blip>
+          <a:srcRect/>
+          <a:stretch>
+            <a:fillRect/>
+          </a:stretch>
+        </p:blipFill>
+        <p:spPr bwMode="auto">
+          <a:xfrm>
+            <a:off x="4038600" y="1600200"/>
+            <a:ext cx="4800600" cy="3886200"/>
+          </a:xfrm>
+          <a:prstGeom prst="rect">
+            <a:avLst/>
+          </a:prstGeom>
+          <a:noFill/>
+          <a:ln>
+            <a:noFill/>
+          </a:ln>
+        </p:spPr>
+      </p:pic>
+      <p:sp>
+        <p:nvSpPr>
+          <p:cNvPr id="6" name="TextBox 5"/>
+          <p:cNvSpPr txBox="1"/>
+          <p:nvPr/>
+        </p:nvSpPr>
+        <p:spPr>
+          <a:xfrm>
+            <a:off x="3962400" y="5638800"/>
+            <a:ext cx="4495800" cy="461665"/>
+          </a:xfrm>
+          <a:prstGeom prst="rect">
+            <a:avLst/>
+          </a:prstGeom>
+          <a:noFill/>
+        </p:spPr>
+        <p:txBody>
+          <a:bodyPr wrap="square" rtlCol="0">
+            <a:spAutoFit/>
+          </a:bodyPr>
+          <a:lstStyle/>
+          <a:p>
+            <a:r>
+              <a:rPr lang="en-US" sz="2400" dirty="0" smtClean="0"/>
+              <a:t>Task Network Diagram</a:t>
+            </a:r>
+            <a:endParaRPr lang="en-US" sz="2400" dirty="0"/>
+          </a:p>
+        </p:txBody>
+      </p:sp>
+    </p:spTree>
+  </p:cSld>
+  <p:clrMapOvr>
+    <a:masterClrMapping/>
+  </p:clrMapOvr>
+  <p:timing>
+    <p:tnLst>
+      <p:par>
+        <p:cTn id="1" dur="indefinite" restart="never" nodeType="tmRoot"/>
+      </p:par>
+    </p:tnLst>
+  </p:timing>
+</p:sld>
+</file>
+
+<file path=ppt/slides/slide12.xml><?xml version="1.0" encoding="utf-8"?>
+<p:sld xmlns:a="http://schemas.openxmlformats.org/drawingml/2006/main" xmlns:r="http://schemas.openxmlformats.org/officeDocument/2006/relationships" xmlns:p="http://schemas.openxmlformats.org/presentationml/2006/main">
+  <p:cSld>
+    <p:spTree>
+      <p:nvGrpSpPr>
+        <p:cNvPr id="1" name=""/>
+        <p:cNvGrpSpPr/>
+        <p:nvPr/>
+      </p:nvGrpSpPr>
+      <p:grpSpPr>
+        <a:xfrm>
+          <a:off x="0" y="0"/>
+          <a:ext cx="0" cy="0"/>
+          <a:chOff x="0" y="0"/>
+          <a:chExt cx="0" cy="0"/>
+        </a:xfrm>
+      </p:grpSpPr>
+      <p:sp>
+        <p:nvSpPr>
+          <p:cNvPr id="2" name="Title 1"/>
+          <p:cNvSpPr>
+            <a:spLocks noGrp="1"/>
+          </p:cNvSpPr>
+          <p:nvPr>
+            <p:ph type="title"/>
+          </p:nvPr>
+        </p:nvSpPr>
+        <p:spPr/>
+        <p:txBody>
+          <a:bodyPr/>
+          <a:lstStyle/>
+          <a:p>
+            <a:r>
+              <a:rPr lang="en-US" dirty="0" smtClean="0"/>
+              <a:t>Time Line</a:t>
+            </a:r>
+            <a:endParaRPr lang="en-US" dirty="0"/>
+          </a:p>
+        </p:txBody>
+      </p:sp>
+      <p:pic>
+        <p:nvPicPr>
+          <p:cNvPr id="3" name="Picture 2" descr="Macintosh HD:Users:watdahieu:Dropbox:Timeline.png"/>
+          <p:cNvPicPr/>
+          <p:nvPr/>
+        </p:nvPicPr>
+        <p:blipFill>
+          <a:blip r:embed="rId2" cstate="print">
+            <a:extLst>
+              <a:ext uri="{28A0092B-C50C-407E-A947-70E740481C1C}">
+                <a14:useLocalDpi xmlns="" xmlns:wpc="http://schemas.microsoft.com/office/word/2010/wordprocessingCanvas" xmlns:mo="http://schemas.microsoft.com/office/mac/office/2008/main" xmlns:mc="http://schemas.openxmlformats.org/markup-compatibility/2006" xmlns:mv="urn:schemas-microsoft-com:mac:vml" xmlns:o="urn:schemas-microsoft-com:office:office" xmlns:m="http://schemas.openxmlformats.org/officeDocument/2006/math" xmlns:v="urn:schemas-microsoft-com:vml" xmlns:wp14="http://schemas.microsoft.com/office/word/2010/wordprocessingDrawing" xmlns:wp="http://schemas.openxmlformats.org/drawingml/2006/wordprocessingDrawing" xmlns:w10="urn:schemas-microsoft-com:office:word" xmlns:w="http://schemas.openxmlformats.org/wordprocessingml/2006/main" xmlns:w14="http://schemas.microsoft.com/office/word/2010/wordml" xmlns:wpg="http://schemas.microsoft.com/office/word/2010/wordprocessingGroup" xmlns:wpi="http://schemas.microsoft.com/office/word/2010/wordprocessingInk" xmlns:wne="http://schemas.microsoft.com/office/word/2006/wordml" xmlns:wps="http://schemas.microsoft.com/office/word/2010/wordprocessingShape" xmlns:a14="http://schemas.microsoft.com/office/drawing/2010/main" xmlns:pic="http://schemas.openxmlformats.org/drawingml/2006/picture" xmlns:lc="http://schemas.openxmlformats.org/drawingml/2006/lockedCanvas" val="0"/>
+              </a:ext>
+            </a:extLst>
+          </a:blip>
+          <a:srcRect/>
+          <a:stretch>
+            <a:fillRect/>
+          </a:stretch>
+        </p:blipFill>
+        <p:spPr bwMode="auto">
+          <a:xfrm>
+            <a:off x="1600517" y="1333500"/>
+            <a:ext cx="6400483" cy="4610100"/>
+          </a:xfrm>
+          <a:prstGeom prst="rect">
+            <a:avLst/>
+          </a:prstGeom>
+          <a:noFill/>
+          <a:ln>
+            <a:noFill/>
+          </a:ln>
+        </p:spPr>
+      </p:pic>
+    </p:spTree>
+  </p:cSld>
+  <p:clrMapOvr>
+    <a:masterClrMapping/>
+  </p:clrMapOvr>
+  <p:timing>
+    <p:tnLst>
+      <p:par>
+        <p:cTn id="1" dur="indefinite" restart="never" nodeType="tmRoot"/>
+      </p:par>
+    </p:tnLst>
+  </p:timing>
+</p:sld>
+</file>
+
+<file path=ppt/slides/slide13.xml><?xml version="1.0" encoding="utf-8"?>
+<p:sld xmlns:a="http://schemas.openxmlformats.org/drawingml/2006/main" xmlns:r="http://schemas.openxmlformats.org/officeDocument/2006/relationships" xmlns:p="http://schemas.openxmlformats.org/presentationml/2006/main">
+  <p:cSld>
+    <p:spTree>
+      <p:nvGrpSpPr>
+        <p:cNvPr id="1" name=""/>
+        <p:cNvGrpSpPr/>
+        <p:nvPr/>
+      </p:nvGrpSpPr>
+      <p:grpSpPr>
+        <a:xfrm>
+          <a:off x="0" y="0"/>
+          <a:ext cx="0" cy="0"/>
+          <a:chOff x="0" y="0"/>
+          <a:chExt cx="0" cy="0"/>
+        </a:xfrm>
+      </p:grpSpPr>
+      <p:sp>
+        <p:nvSpPr>
+          <p:cNvPr id="2" name="Title 1"/>
+          <p:cNvSpPr>
+            <a:spLocks noGrp="1"/>
+          </p:cNvSpPr>
+          <p:nvPr>
+            <p:ph type="title"/>
+          </p:nvPr>
+        </p:nvSpPr>
+        <p:spPr/>
+        <p:txBody>
+          <a:bodyPr/>
+          <a:lstStyle/>
+          <a:p>
+            <a:r>
+              <a:rPr lang="en-US" dirty="0" smtClean="0"/>
+              <a:t>Network Diagram</a:t>
+            </a:r>
+            <a:endParaRPr lang="en-US" dirty="0"/>
+          </a:p>
+        </p:txBody>
+      </p:sp>
+      <p:pic>
+        <p:nvPicPr>
+          <p:cNvPr id="3" name="Picture 2" descr="Macintosh HD:Users:watdahieu:Dropbox:Network1.png"/>
+          <p:cNvPicPr/>
+          <p:nvPr/>
+        </p:nvPicPr>
+        <p:blipFill>
+          <a:blip r:embed="rId2" cstate="print">
+            <a:extLst>
+              <a:ext uri="{28A0092B-C50C-407E-A947-70E740481C1C}">
+                <a14:useLocalDpi xmlns="" xmlns:wpc="http://schemas.microsoft.com/office/word/2010/wordprocessingCanvas" xmlns:mo="http://schemas.microsoft.com/office/mac/office/2008/main" xmlns:mc="http://schemas.openxmlformats.org/markup-compatibility/2006" xmlns:mv="urn:schemas-microsoft-com:mac:vml" xmlns:o="urn:schemas-microsoft-com:office:office" xmlns:m="http://schemas.openxmlformats.org/officeDocument/2006/math" xmlns:v="urn:schemas-microsoft-com:vml" xmlns:wp14="http://schemas.microsoft.com/office/word/2010/wordprocessingDrawing" xmlns:wp="http://schemas.openxmlformats.org/drawingml/2006/wordprocessingDrawing" xmlns:w10="urn:schemas-microsoft-com:office:word" xmlns:w="http://schemas.openxmlformats.org/wordprocessingml/2006/main" xmlns:w14="http://schemas.microsoft.com/office/word/2010/wordml" xmlns:wpg="http://schemas.microsoft.com/office/word/2010/wordprocessingGroup" xmlns:wpi="http://schemas.microsoft.com/office/word/2010/wordprocessingInk" xmlns:wne="http://schemas.microsoft.com/office/word/2006/wordml" xmlns:wps="http://schemas.microsoft.com/office/word/2010/wordprocessingShape" xmlns:a14="http://schemas.microsoft.com/office/drawing/2010/main" xmlns:pic="http://schemas.openxmlformats.org/drawingml/2006/picture" xmlns:lc="http://schemas.openxmlformats.org/drawingml/2006/lockedCanvas" val="0"/>
+              </a:ext>
+            </a:extLst>
+          </a:blip>
+          <a:srcRect/>
+          <a:stretch>
+            <a:fillRect/>
+          </a:stretch>
+        </p:blipFill>
+        <p:spPr bwMode="auto">
+          <a:xfrm>
+            <a:off x="0" y="1600200"/>
+            <a:ext cx="4953000" cy="3962400"/>
+          </a:xfrm>
+          <a:prstGeom prst="rect">
+            <a:avLst/>
+          </a:prstGeom>
+          <a:noFill/>
+          <a:ln>
+            <a:noFill/>
+          </a:ln>
+        </p:spPr>
+      </p:pic>
+      <p:pic>
+        <p:nvPicPr>
+          <p:cNvPr id="4" name="Picture 3" descr="Macintosh HD:Users:watdahieu:Dropbox:Network2.png"/>
+          <p:cNvPicPr/>
+          <p:nvPr/>
+        </p:nvPicPr>
+        <p:blipFill>
+          <a:blip r:embed="rId3" cstate="print">
+            <a:extLst>
+              <a:ext uri="{28A0092B-C50C-407E-A947-70E740481C1C}">
+                <a14:useLocalDpi xmlns="" xmlns:wpc="http://schemas.microsoft.com/office/word/2010/wordprocessingCanvas" xmlns:mo="http://schemas.microsoft.com/office/mac/office/2008/main" xmlns:mc="http://schemas.openxmlformats.org/markup-compatibility/2006" xmlns:mv="urn:schemas-microsoft-com:mac:vml" xmlns:o="urn:schemas-microsoft-com:office:office" xmlns:m="http://schemas.openxmlformats.org/officeDocument/2006/math" xmlns:v="urn:schemas-microsoft-com:vml" xmlns:wp14="http://schemas.microsoft.com/office/word/2010/wordprocessingDrawing" xmlns:wp="http://schemas.openxmlformats.org/drawingml/2006/wordprocessingDrawing" xmlns:w10="urn:schemas-microsoft-com:office:word" xmlns:w="http://schemas.openxmlformats.org/wordprocessingml/2006/main" xmlns:w14="http://schemas.microsoft.com/office/word/2010/wordml" xmlns:wpg="http://schemas.microsoft.com/office/word/2010/wordprocessingGroup" xmlns:wpi="http://schemas.microsoft.com/office/word/2010/wordprocessingInk" xmlns:wne="http://schemas.microsoft.com/office/word/2006/wordml" xmlns:wps="http://schemas.microsoft.com/office/word/2010/wordprocessingShape" xmlns:a14="http://schemas.microsoft.com/office/drawing/2010/main" xmlns:pic="http://schemas.openxmlformats.org/drawingml/2006/picture" xmlns:lc="http://schemas.openxmlformats.org/drawingml/2006/lockedCanvas" val="0"/>
+              </a:ext>
+            </a:extLst>
+          </a:blip>
+          <a:srcRect r="28051" b="3846"/>
+          <a:stretch>
+            <a:fillRect/>
+          </a:stretch>
+        </p:blipFill>
+        <p:spPr bwMode="auto">
+          <a:xfrm>
+            <a:off x="4953000" y="1600200"/>
+            <a:ext cx="4191000" cy="3962400"/>
+          </a:xfrm>
+          <a:prstGeom prst="rect">
+            <a:avLst/>
+          </a:prstGeom>
+          <a:noFill/>
+          <a:ln>
+            <a:noFill/>
+          </a:ln>
+        </p:spPr>
+      </p:pic>
+    </p:spTree>
+  </p:cSld>
+  <p:clrMapOvr>
+    <a:masterClrMapping/>
+  </p:clrMapOvr>
+  <p:timing>
+    <p:tnLst>
+      <p:par>
+        <p:cTn id="1" dur="indefinite" restart="never" nodeType="tmRoot"/>
+      </p:par>
+    </p:tnLst>
+  </p:timing>
+</p:sld>
+</file>
+
+<file path=ppt/slides/slide14.xml><?xml version="1.0" encoding="utf-8"?>
+<p:sld xmlns:a="http://schemas.openxmlformats.org/drawingml/2006/main" xmlns:r="http://schemas.openxmlformats.org/officeDocument/2006/relationships" xmlns:p="http://schemas.openxmlformats.org/presentationml/2006/main">
+  <p:cSld>
+    <p:spTree>
+      <p:nvGrpSpPr>
+        <p:cNvPr id="1" name=""/>
+        <p:cNvGrpSpPr/>
+        <p:nvPr/>
+      </p:nvGrpSpPr>
+      <p:grpSpPr>
+        <a:xfrm>
+          <a:off x="0" y="0"/>
+          <a:ext cx="0" cy="0"/>
+          <a:chOff x="0" y="0"/>
+          <a:chExt cx="0" cy="0"/>
+        </a:xfrm>
+      </p:grpSpPr>
+      <p:sp>
+        <p:nvSpPr>
+          <p:cNvPr id="2" name="Title 1"/>
+          <p:cNvSpPr>
+            <a:spLocks noGrp="1"/>
+          </p:cNvSpPr>
+          <p:nvPr>
+            <p:ph type="title"/>
+          </p:nvPr>
+        </p:nvSpPr>
+        <p:spPr/>
+        <p:txBody>
+          <a:bodyPr/>
+          <a:lstStyle/>
+          <a:p>
+            <a:r>
+              <a:rPr lang="en-US" dirty="0" smtClean="0"/>
               <a:t>Interface Design</a:t>
             </a:r>
             <a:endParaRPr lang="en-US" dirty="0"/>
@@ -4426,7 +4822,7 @@
           <a:blip r:embed="rId2" cstate="print">
             <a:extLst>
               <a:ext uri="{28A0092B-C50C-407E-A947-70E740481C1C}">
-                <a14:useLocalDpi xmlns:ve="http://schemas.openxmlformats.org/markup-compatibility/2006" xmlns:m="http://schemas.openxmlformats.org/officeDocument/2006/math" xmlns:wp="http://schemas.openxmlformats.org/drawingml/2006/wordprocessingDrawing" xmlns:wne="http://schemas.microsoft.com/office/word/2006/wordml" xmlns:a14="http://schemas.microsoft.com/office/drawing/2010/main" xmlns:wps="http://schemas.microsoft.com/office/word/2010/wordprocessingShape" xmlns:wpi="http://schemas.microsoft.com/office/word/2010/wordprocessingInk" xmlns:wpg="http://schemas.microsoft.com/office/word/2010/wordprocessingGroup" xmlns:w14="http://schemas.microsoft.com/office/word/2010/wordml" xmlns:w="http://schemas.openxmlformats.org/wordprocessingml/2006/main" xmlns:w10="urn:schemas-microsoft-com:office:word" xmlns:wp14="http://schemas.microsoft.com/office/word/2010/wordprocessingDrawing" xmlns:v="urn:schemas-microsoft-com:vml" xmlns:o="urn:schemas-microsoft-com:office:office" xmlns:mv="urn:schemas-microsoft-com:mac:vml" xmlns:mc="http://schemas.openxmlformats.org/markup-compatibility/2006" xmlns:mo="http://schemas.microsoft.com/office/mac/office/2008/main" xmlns:wpc="http://schemas.microsoft.com/office/word/2010/wordprocessingCanvas" xmlns="" xmlns:pic="http://schemas.openxmlformats.org/drawingml/2006/picture" xmlns:lc="http://schemas.openxmlformats.org/drawingml/2006/lockedCanvas" val="0"/>
+                <a14:useLocalDpi xmlns:lc="http://schemas.openxmlformats.org/drawingml/2006/lockedCanvas" xmlns:pic="http://schemas.openxmlformats.org/drawingml/2006/picture" xmlns="" xmlns:wpc="http://schemas.microsoft.com/office/word/2010/wordprocessingCanvas" xmlns:mo="http://schemas.microsoft.com/office/mac/office/2008/main" xmlns:mc="http://schemas.openxmlformats.org/markup-compatibility/2006" xmlns:mv="urn:schemas-microsoft-com:mac:vml" xmlns:o="urn:schemas-microsoft-com:office:office" xmlns:v="urn:schemas-microsoft-com:vml" xmlns:wp14="http://schemas.microsoft.com/office/word/2010/wordprocessingDrawing" xmlns:w10="urn:schemas-microsoft-com:office:word" xmlns:w="http://schemas.openxmlformats.org/wordprocessingml/2006/main" xmlns:w14="http://schemas.microsoft.com/office/word/2010/wordml" xmlns:wpg="http://schemas.microsoft.com/office/word/2010/wordprocessingGroup" xmlns:wpi="http://schemas.microsoft.com/office/word/2010/wordprocessingInk" xmlns:wps="http://schemas.microsoft.com/office/word/2010/wordprocessingShape" xmlns:a14="http://schemas.microsoft.com/office/drawing/2010/main" xmlns:wne="http://schemas.microsoft.com/office/word/2006/wordml" xmlns:wp="http://schemas.openxmlformats.org/drawingml/2006/wordprocessingDrawing" xmlns:m="http://schemas.openxmlformats.org/officeDocument/2006/math" xmlns:ve="http://schemas.openxmlformats.org/markup-compatibility/2006" val="0"/>
               </a:ext>
             </a:extLst>
           </a:blip>
@@ -4464,7 +4860,7 @@
 </p:sld>
 </file>
 
-<file path=ppt/slides/slide12.xml><?xml version="1.0" encoding="utf-8"?>
+<file path=ppt/slides/slide15.xml><?xml version="1.0" encoding="utf-8"?>
 <p:sld xmlns:a="http://schemas.openxmlformats.org/drawingml/2006/main" xmlns:r="http://schemas.openxmlformats.org/officeDocument/2006/relationships" xmlns:p="http://schemas.openxmlformats.org/presentationml/2006/main">
   <p:cSld>
     <p:spTree>
@@ -4518,7 +4914,7 @@
           <a:blip r:embed="rId2" cstate="print">
             <a:extLst>
               <a:ext uri="{28A0092B-C50C-407E-A947-70E740481C1C}">
-                <a14:useLocalDpi xmlns:a14="http://schemas.microsoft.com/office/drawing/2010/main" xmlns="" val="0"/>
+                <a14:useLocalDpi xmlns="" xmlns:a14="http://schemas.microsoft.com/office/drawing/2010/main" val="0"/>
               </a:ext>
             </a:extLst>
           </a:blip>
@@ -4539,10 +4935,17 @@
   <p:clrMapOvr>
     <a:masterClrMapping/>
   </p:clrMapOvr>
+  <p:timing>
+    <p:tnLst>
+      <p:par>
+        <p:cTn id="1" dur="indefinite" restart="never" nodeType="tmRoot"/>
+      </p:par>
+    </p:tnLst>
+  </p:timing>
 </p:sld>
 </file>
 
-<file path=ppt/slides/slide13.xml><?xml version="1.0" encoding="utf-8"?>
+<file path=ppt/slides/slide16.xml><?xml version="1.0" encoding="utf-8"?>
 <p:sld xmlns:a="http://schemas.openxmlformats.org/drawingml/2006/main" xmlns:r="http://schemas.openxmlformats.org/officeDocument/2006/relationships" xmlns:p="http://schemas.openxmlformats.org/presentationml/2006/main">
   <p:cSld>
     <p:spTree>
@@ -4596,7 +4999,7 @@
           <a:blip r:embed="rId2" cstate="print">
             <a:extLst>
               <a:ext uri="{28A0092B-C50C-407E-A947-70E740481C1C}">
-                <a14:useLocalDpi xmlns:a14="http://schemas.microsoft.com/office/drawing/2010/main" xmlns="" val="0"/>
+                <a14:useLocalDpi xmlns="" xmlns:a14="http://schemas.microsoft.com/office/drawing/2010/main" val="0"/>
               </a:ext>
             </a:extLst>
           </a:blip>
@@ -4619,10 +5022,17 @@
   <p:clrMapOvr>
     <a:masterClrMapping/>
   </p:clrMapOvr>
+  <p:timing>
+    <p:tnLst>
+      <p:par>
+        <p:cTn id="1" dur="indefinite" restart="never" nodeType="tmRoot"/>
+      </p:par>
+    </p:tnLst>
+  </p:timing>
 </p:sld>
 </file>
 
-<file path=ppt/slides/slide14.xml><?xml version="1.0" encoding="utf-8"?>
+<file path=ppt/slides/slide17.xml><?xml version="1.0" encoding="utf-8"?>
 <p:sld xmlns:a="http://schemas.openxmlformats.org/drawingml/2006/main" xmlns:r="http://schemas.openxmlformats.org/officeDocument/2006/relationships" xmlns:p="http://schemas.openxmlformats.org/presentationml/2006/main">
   <p:cSld>
     <p:spTree>
@@ -4674,7 +5084,7 @@
           <a:blip r:embed="rId2" cstate="print">
             <a:extLst>
               <a:ext uri="{28A0092B-C50C-407E-A947-70E740481C1C}">
-                <a14:useLocalDpi xmlns:a14="http://schemas.microsoft.com/office/drawing/2010/main" xmlns="" val="0"/>
+                <a14:useLocalDpi xmlns="" xmlns:a14="http://schemas.microsoft.com/office/drawing/2010/main" val="0"/>
               </a:ext>
             </a:extLst>
           </a:blip>
@@ -4697,10 +5107,17 @@
   <p:clrMapOvr>
     <a:masterClrMapping/>
   </p:clrMapOvr>
+  <p:timing>
+    <p:tnLst>
+      <p:par>
+        <p:cTn id="1" dur="indefinite" restart="never" nodeType="tmRoot"/>
+      </p:par>
+    </p:tnLst>
+  </p:timing>
 </p:sld>
 </file>
 
-<file path=ppt/slides/slide15.xml><?xml version="1.0" encoding="utf-8"?>
+<file path=ppt/slides/slide18.xml><?xml version="1.0" encoding="utf-8"?>
 <p:sld xmlns:a="http://schemas.openxmlformats.org/drawingml/2006/main" xmlns:r="http://schemas.openxmlformats.org/officeDocument/2006/relationships" xmlns:p="http://schemas.openxmlformats.org/presentationml/2006/main">
   <p:cSld>
     <p:spTree>
@@ -4780,11 +5197,7 @@
             <a:pPr lvl="1"/>
             <a:r>
               <a:rPr lang="en-US" sz="2800" dirty="0" smtClean="0"/>
-              <a:t>Meetings </a:t>
-            </a:r>
-            <a:r>
-              <a:rPr lang="en-US" sz="2800" dirty="0" smtClean="0"/>
-              <a:t>with Client</a:t>
+              <a:t>Meetings with Client</a:t>
             </a:r>
           </a:p>
           <a:p>
@@ -4830,7 +5243,6 @@
               <a:rPr lang="en-US" sz="4000" dirty="0" smtClean="0"/>
               <a:t>Future Work</a:t>
             </a:r>
-            <a:endParaRPr lang="en-US" sz="4000" dirty="0" smtClean="0"/>
           </a:p>
           <a:p>
             <a:pPr lvl="1"/>
@@ -4886,10 +5298,17 @@
   <p:clrMapOvr>
     <a:masterClrMapping/>
   </p:clrMapOvr>
+  <p:timing>
+    <p:tnLst>
+      <p:par>
+        <p:cTn id="1" dur="indefinite" restart="never" nodeType="tmRoot"/>
+      </p:par>
+    </p:tnLst>
+  </p:timing>
 </p:sld>
 </file>
 
-<file path=ppt/slides/slide16.xml><?xml version="1.0" encoding="utf-8"?>
+<file path=ppt/slides/slide19.xml><?xml version="1.0" encoding="utf-8"?>
 <p:sld xmlns:a="http://schemas.openxmlformats.org/drawingml/2006/main" xmlns:r="http://schemas.openxmlformats.org/officeDocument/2006/relationships" xmlns:p="http://schemas.openxmlformats.org/presentationml/2006/main">
   <p:cSld>
     <p:spTree>
@@ -4971,7 +5390,6 @@
               <a:rPr lang="en-US" dirty="0" smtClean="0"/>
               <a:t>. Web. 10 Mar. 2015.</a:t>
             </a:r>
-            <a:endParaRPr lang="en-US" dirty="0" smtClean="0"/>
           </a:p>
         </p:txBody>
       </p:sp>
@@ -5157,8 +5575,9 @@
           <a:p>
             <a:r>
               <a:rPr lang="en-US" dirty="0" smtClean="0"/>
-              <a:t>System  Architecture </a:t>
-            </a:r>
+              <a:t>System Architecture </a:t>
+            </a:r>
+            <a:endParaRPr lang="en-US" dirty="0" smtClean="0"/>
           </a:p>
           <a:p>
             <a:r>
@@ -5181,13 +5600,8 @@
           <a:p>
             <a:r>
               <a:rPr lang="en-US" dirty="0" smtClean="0"/>
-              <a:t>Work-to-date and </a:t>
-            </a:r>
-            <a:r>
-              <a:rPr lang="en-US" smtClean="0"/>
-              <a:t>Future Work</a:t>
-            </a:r>
-            <a:endParaRPr lang="en-US" dirty="0" smtClean="0"/>
+              <a:t>Work-to-date and Future Work</a:t>
+            </a:r>
           </a:p>
           <a:p>
             <a:endParaRPr lang="en-US" dirty="0" smtClean="0"/>
@@ -5202,6 +5616,13 @@
   <p:clrMapOvr>
     <a:masterClrMapping/>
   </p:clrMapOvr>
+  <p:timing>
+    <p:tnLst>
+      <p:par>
+        <p:cTn id="1" dur="indefinite" restart="never" nodeType="tmRoot"/>
+      </p:par>
+    </p:tnLst>
+  </p:timing>
 </p:sld>
 </file>
 
@@ -5263,7 +5684,7 @@
         </p:spPr>
         <p:txBody>
           <a:bodyPr>
-            <a:normAutofit fontScale="92500" lnSpcReduction="10000"/>
+            <a:normAutofit fontScale="92500" lnSpcReduction="20000"/>
           </a:bodyPr>
           <a:lstStyle/>
           <a:p>
@@ -5276,13 +5697,42 @@
             <a:pPr lvl="1"/>
             <a:r>
               <a:rPr lang="en-US" dirty="0" smtClean="0"/>
-              <a:t>Heating a liquid droplet above its B.P. creates a vapor pillow of its own gases underneath it – appears to levitate </a:t>
-            </a:r>
-          </a:p>
-          <a:p>
-            <a:r>
-              <a:rPr lang="en-US" dirty="0" smtClean="0"/>
-              <a:t>W/ little friction b/w vapor &amp; surface, slight disturbances move the droplet</a:t>
+              <a:t>Heating a liquid droplet above its </a:t>
+            </a:r>
+            <a:r>
+              <a:rPr lang="en-US" dirty="0" smtClean="0"/>
+              <a:t>boiling point</a:t>
+            </a:r>
+            <a:r>
+              <a:rPr lang="en-US" dirty="0" smtClean="0"/>
+              <a:t> </a:t>
+            </a:r>
+            <a:r>
+              <a:rPr lang="en-US" dirty="0" smtClean="0"/>
+              <a:t>creates a vapor pillow of its own gases underneath </a:t>
+            </a:r>
+            <a:r>
+              <a:rPr lang="en-US" dirty="0" smtClean="0"/>
+              <a:t>it</a:t>
+            </a:r>
+            <a:endParaRPr lang="en-US" dirty="0" smtClean="0"/>
+          </a:p>
+          <a:p>
+            <a:r>
+              <a:rPr lang="en-US" dirty="0" smtClean="0"/>
+              <a:t>With </a:t>
+            </a:r>
+            <a:r>
+              <a:rPr lang="en-US" dirty="0" smtClean="0"/>
+              <a:t>little friction </a:t>
+            </a:r>
+            <a:r>
+              <a:rPr lang="en-US" dirty="0" smtClean="0"/>
+              <a:t>between </a:t>
+            </a:r>
+            <a:r>
+              <a:rPr lang="en-US" dirty="0" smtClean="0"/>
+              <a:t>vapor &amp; surface, slight disturbances move the droplet</a:t>
             </a:r>
           </a:p>
           <a:p>
@@ -5431,7 +5881,7 @@
         </p:spPr>
         <p:txBody>
           <a:bodyPr>
-            <a:normAutofit/>
+            <a:normAutofit lnSpcReduction="10000"/>
           </a:bodyPr>
           <a:lstStyle/>
           <a:p>
@@ -5457,7 +5907,11 @@
           <a:p>
             <a:r>
               <a:rPr lang="en-US" dirty="0" smtClean="0"/>
-              <a:t>IP tool to collect such data from images taken through high-speed camera</a:t>
+              <a:t>Image Processing </a:t>
+            </a:r>
+            <a:r>
+              <a:rPr lang="en-US" dirty="0" smtClean="0"/>
+              <a:t>tool to collect such data from images taken through high-speed camera</a:t>
             </a:r>
             <a:endParaRPr lang="en-US" dirty="0"/>
           </a:p>
@@ -5496,6 +5950,13 @@
   <p:clrMapOvr>
     <a:masterClrMapping/>
   </p:clrMapOvr>
+  <p:timing>
+    <p:tnLst>
+      <p:par>
+        <p:cTn id="1" dur="indefinite" restart="never" nodeType="tmRoot"/>
+      </p:par>
+    </p:tnLst>
+  </p:timing>
 </p:sld>
 </file>
 
@@ -5833,15 +6294,7 @@
           <a:p>
             <a:r>
               <a:rPr lang="en-US" dirty="0" smtClean="0"/>
-              <a:t>Conversion of </a:t>
-            </a:r>
-            <a:r>
-              <a:rPr lang="en-US" dirty="0" smtClean="0"/>
-              <a:t>pixel units </a:t>
-            </a:r>
-            <a:r>
-              <a:rPr lang="en-US" dirty="0" smtClean="0"/>
-              <a:t>to </a:t>
+              <a:t>Conversion of pixel units to </a:t>
             </a:r>
             <a:r>
               <a:rPr lang="en-US" dirty="0" smtClean="0">
@@ -5862,6 +6315,13 @@
   <p:clrMapOvr>
     <a:masterClrMapping/>
   </p:clrMapOvr>
+  <p:timing>
+    <p:tnLst>
+      <p:par>
+        <p:cTn id="1" dur="indefinite" restart="never" nodeType="tmRoot"/>
+      </p:par>
+    </p:tnLst>
+  </p:timing>
 </p:sld>
 </file>
 
@@ -5922,7 +6382,15 @@
           <a:p>
             <a:r>
               <a:rPr lang="en-US" dirty="0" smtClean="0"/>
-              <a:t>Start new project w/ OOP structure and bring in working components from Version 1</a:t>
+              <a:t>Start new project </a:t>
+            </a:r>
+            <a:r>
+              <a:rPr lang="en-US" dirty="0" smtClean="0"/>
+              <a:t>with </a:t>
+            </a:r>
+            <a:r>
+              <a:rPr lang="en-US" dirty="0" smtClean="0"/>
+              <a:t>OOP structure and bring in working components from Version 1</a:t>
             </a:r>
           </a:p>
           <a:p>
@@ -5947,6 +6415,13 @@
   <p:clrMapOvr>
     <a:masterClrMapping/>
   </p:clrMapOvr>
+  <p:timing>
+    <p:tnLst>
+      <p:par>
+        <p:cTn id="1" dur="indefinite" restart="never" nodeType="tmRoot"/>
+      </p:par>
+    </p:tnLst>
+  </p:timing>
 </p:sld>
 </file>
 
@@ -6012,17 +6487,29 @@
           <a:p>
             <a:r>
               <a:rPr lang="en-US" dirty="0" smtClean="0"/>
-              <a:t>simple use and easy to understand </a:t>
-            </a:r>
-            <a:r>
-              <a:rPr lang="en-US" dirty="0" smtClean="0"/>
-              <a:t>style</a:t>
-            </a:r>
-          </a:p>
-          <a:p>
-            <a:r>
-              <a:rPr lang="en-US" dirty="0" smtClean="0"/>
-              <a:t>requirements are well established and unlikely to be significantly changed</a:t>
+              <a:t>S</a:t>
+            </a:r>
+            <a:r>
+              <a:rPr lang="en-US" dirty="0" smtClean="0"/>
+              <a:t>imple </a:t>
+            </a:r>
+            <a:r>
+              <a:rPr lang="en-US" dirty="0" smtClean="0"/>
+              <a:t>use and easy to understand style</a:t>
+            </a:r>
+          </a:p>
+          <a:p>
+            <a:r>
+              <a:rPr lang="en-US" dirty="0" smtClean="0"/>
+              <a:t>R</a:t>
+            </a:r>
+            <a:r>
+              <a:rPr lang="en-US" dirty="0" smtClean="0"/>
+              <a:t>equirements well </a:t>
+            </a:r>
+            <a:r>
+              <a:rPr lang="en-US" dirty="0" smtClean="0"/>
+              <a:t>established and unlikely to be significantly changed</a:t>
             </a:r>
             <a:endParaRPr lang="en-US" dirty="0"/>
           </a:p>
@@ -6042,7 +6529,7 @@
           <a:blip r:embed="rId2" cstate="print">
             <a:extLst>
               <a:ext uri="{28A0092B-C50C-407E-A947-70E740481C1C}">
-                <a14:useLocalDpi xmlns="" xmlns:wpc="http://schemas.microsoft.com/office/word/2010/wordprocessingCanvas" xmlns:mo="http://schemas.microsoft.com/office/mac/office/2008/main" xmlns:mc="http://schemas.openxmlformats.org/markup-compatibility/2006" xmlns:mv="urn:schemas-microsoft-com:mac:vml" xmlns:o="urn:schemas-microsoft-com:office:office" xmlns:m="http://schemas.openxmlformats.org/officeDocument/2006/math" xmlns:v="urn:schemas-microsoft-com:vml" xmlns:wp14="http://schemas.microsoft.com/office/word/2010/wordprocessingDrawing" xmlns:wp="http://schemas.openxmlformats.org/drawingml/2006/wordprocessingDrawing" xmlns:w10="urn:schemas-microsoft-com:office:word" xmlns:w="http://schemas.openxmlformats.org/wordprocessingml/2006/main" xmlns:w14="http://schemas.microsoft.com/office/word/2010/wordml" xmlns:wpg="http://schemas.microsoft.com/office/word/2010/wordprocessingGroup" xmlns:wpi="http://schemas.microsoft.com/office/word/2010/wordprocessingInk" xmlns:wne="http://schemas.microsoft.com/office/word/2006/wordml" xmlns:wps="http://schemas.microsoft.com/office/word/2010/wordprocessingShape" xmlns:a14="http://schemas.microsoft.com/office/drawing/2010/main" xmlns:pic="http://schemas.openxmlformats.org/drawingml/2006/picture" xmlns:lc="http://schemas.openxmlformats.org/drawingml/2006/lockedCanvas" val="0"/>
+                <a14:useLocalDpi xmlns:lc="http://schemas.openxmlformats.org/drawingml/2006/lockedCanvas" xmlns:pic="http://schemas.openxmlformats.org/drawingml/2006/picture" xmlns:a14="http://schemas.microsoft.com/office/drawing/2010/main" xmlns:wps="http://schemas.microsoft.com/office/word/2010/wordprocessingShape" xmlns:wne="http://schemas.microsoft.com/office/word/2006/wordml" xmlns:wpi="http://schemas.microsoft.com/office/word/2010/wordprocessingInk" xmlns:wpg="http://schemas.microsoft.com/office/word/2010/wordprocessingGroup" xmlns:w14="http://schemas.microsoft.com/office/word/2010/wordml" xmlns:w="http://schemas.openxmlformats.org/wordprocessingml/2006/main" xmlns:w10="urn:schemas-microsoft-com:office:word" xmlns:wp="http://schemas.openxmlformats.org/drawingml/2006/wordprocessingDrawing" xmlns:wp14="http://schemas.microsoft.com/office/word/2010/wordprocessingDrawing" xmlns:v="urn:schemas-microsoft-com:vml" xmlns:m="http://schemas.openxmlformats.org/officeDocument/2006/math" xmlns:o="urn:schemas-microsoft-com:office:office" xmlns:mv="urn:schemas-microsoft-com:mac:vml" xmlns:mc="http://schemas.openxmlformats.org/markup-compatibility/2006" xmlns:mo="http://schemas.microsoft.com/office/mac/office/2008/main" xmlns:wpc="http://schemas.microsoft.com/office/word/2010/wordprocessingCanvas" xmlns="" val="0"/>
               </a:ext>
             </a:extLst>
           </a:blip>
@@ -6070,6 +6557,13 @@
   <p:clrMapOvr>
     <a:masterClrMapping/>
   </p:clrMapOvr>
+  <p:timing>
+    <p:tnLst>
+      <p:par>
+        <p:cTn id="1" dur="indefinite" restart="never" nodeType="tmRoot"/>
+      </p:par>
+    </p:tnLst>
+  </p:timing>
 </p:sld>
 </file>
 

</xml_diff>

<commit_message>
Edited one point on intro slide
</commit_message>
<xml_diff>
--- a/A Team Documents/Interim presentation.pptx
+++ b/A Team Documents/Interim presentation.pptx
@@ -290,7 +290,7 @@
     </p:spTree>
     <p:extLst>
       <p:ext uri="{BB962C8B-B14F-4D97-AF65-F5344CB8AC3E}">
-        <p14:creationId xmlns:p14="http://schemas.microsoft.com/office/powerpoint/2010/main" val="2856711207"/>
+        <p14:creationId xmlns:p14="http://schemas.microsoft.com/office/powerpoint/2010/main" xmlns="" val="2856711207"/>
       </p:ext>
     </p:extLst>
   </p:cSld>
@@ -552,7 +552,7 @@
     </p:spTree>
     <p:extLst>
       <p:ext uri="{BB962C8B-B14F-4D97-AF65-F5344CB8AC3E}">
-        <p14:creationId xmlns:p14="http://schemas.microsoft.com/office/powerpoint/2010/main" val="3571335044"/>
+        <p14:creationId xmlns:p14="http://schemas.microsoft.com/office/powerpoint/2010/main" xmlns="" val="3571335044"/>
       </p:ext>
     </p:extLst>
   </p:cSld>
@@ -4444,15 +4444,7 @@
           <a:p>
             <a:r>
               <a:rPr lang="en-US" dirty="0" smtClean="0"/>
-              <a:t>Visual Studio </a:t>
-            </a:r>
-            <a:r>
-              <a:rPr lang="en-US" dirty="0" smtClean="0"/>
-              <a:t>&amp; </a:t>
-            </a:r>
-            <a:r>
-              <a:rPr lang="en-US" dirty="0" smtClean="0"/>
-              <a:t>C#</a:t>
+              <a:t>Visual Studio &amp; C#</a:t>
             </a:r>
           </a:p>
           <a:p>
@@ -4488,7 +4480,7 @@
           <a:blip r:embed="rId2" cstate="print">
             <a:extLst>
               <a:ext uri="{28A0092B-C50C-407E-A947-70E740481C1C}">
-                <a14:useLocalDpi xmlns:a14="http://schemas.microsoft.com/office/drawing/2010/main" val="0"/>
+                <a14:useLocalDpi xmlns:a14="http://schemas.microsoft.com/office/drawing/2010/main" xmlns="" val="0"/>
               </a:ext>
             </a:extLst>
           </a:blip>
@@ -4606,7 +4598,7 @@
           <a:blip r:embed="rId2" cstate="print">
             <a:extLst>
               <a:ext uri="{28A0092B-C50C-407E-A947-70E740481C1C}">
-                <a14:useLocalDpi xmlns:a14="http://schemas.microsoft.com/office/drawing/2010/main" val="0"/>
+                <a14:useLocalDpi xmlns:a14="http://schemas.microsoft.com/office/drawing/2010/main" xmlns="" val="0"/>
               </a:ext>
             </a:extLst>
           </a:blip>
@@ -4694,7 +4686,7 @@
           <a:blip r:embed="rId2" cstate="print">
             <a:extLst>
               <a:ext uri="{28A0092B-C50C-407E-A947-70E740481C1C}">
-                <a14:useLocalDpi xmlns:a14="http://schemas.microsoft.com/office/drawing/2010/main" val="0"/>
+                <a14:useLocalDpi xmlns:a14="http://schemas.microsoft.com/office/drawing/2010/main" xmlns="" val="0"/>
               </a:ext>
             </a:extLst>
           </a:blip>
@@ -4727,7 +4719,7 @@
           <a:blip r:embed="rId3" cstate="print">
             <a:extLst>
               <a:ext uri="{28A0092B-C50C-407E-A947-70E740481C1C}">
-                <a14:useLocalDpi xmlns:a14="http://schemas.microsoft.com/office/drawing/2010/main" val="0"/>
+                <a14:useLocalDpi xmlns:a14="http://schemas.microsoft.com/office/drawing/2010/main" xmlns="" val="0"/>
               </a:ext>
             </a:extLst>
           </a:blip>
@@ -4819,7 +4811,7 @@
           <a:blip r:embed="rId2" cstate="print">
             <a:extLst>
               <a:ext uri="{28A0092B-C50C-407E-A947-70E740481C1C}">
-                <a14:useLocalDpi xmlns:a14="http://schemas.microsoft.com/office/drawing/2010/main" val="0"/>
+                <a14:useLocalDpi xmlns:a14="http://schemas.microsoft.com/office/drawing/2010/main" xmlns="" val="0"/>
               </a:ext>
             </a:extLst>
           </a:blip>
@@ -4911,7 +4903,7 @@
           <a:blip r:embed="rId2" cstate="print">
             <a:extLst>
               <a:ext uri="{28A0092B-C50C-407E-A947-70E740481C1C}">
-                <a14:useLocalDpi xmlns:a14="http://schemas.microsoft.com/office/drawing/2010/main" val="0"/>
+                <a14:useLocalDpi xmlns:a14="http://schemas.microsoft.com/office/drawing/2010/main" xmlns="" val="0"/>
               </a:ext>
             </a:extLst>
           </a:blip>
@@ -4996,7 +4988,7 @@
           <a:blip r:embed="rId2" cstate="print">
             <a:extLst>
               <a:ext uri="{28A0092B-C50C-407E-A947-70E740481C1C}">
-                <a14:useLocalDpi xmlns:a14="http://schemas.microsoft.com/office/drawing/2010/main" val="0"/>
+                <a14:useLocalDpi xmlns:a14="http://schemas.microsoft.com/office/drawing/2010/main" xmlns="" val="0"/>
               </a:ext>
             </a:extLst>
           </a:blip>
@@ -5081,7 +5073,7 @@
           <a:blip r:embed="rId2" cstate="print">
             <a:extLst>
               <a:ext uri="{28A0092B-C50C-407E-A947-70E740481C1C}">
-                <a14:useLocalDpi xmlns:a14="http://schemas.microsoft.com/office/drawing/2010/main" val="0"/>
+                <a14:useLocalDpi xmlns:a14="http://schemas.microsoft.com/office/drawing/2010/main" xmlns="" val="0"/>
               </a:ext>
             </a:extLst>
           </a:blip>
@@ -5699,15 +5691,7 @@
           <a:p>
             <a:r>
               <a:rPr lang="en-US" dirty="0" smtClean="0"/>
-              <a:t>With little friction between vapor </a:t>
-            </a:r>
-            <a:r>
-              <a:rPr lang="en-US" dirty="0" smtClean="0"/>
-              <a:t>and surface</a:t>
-            </a:r>
-            <a:r>
-              <a:rPr lang="en-US" dirty="0" smtClean="0"/>
-              <a:t>, slight disturbances move the droplet</a:t>
+              <a:t>With little friction between vapor and surface, slight disturbances move the droplet</a:t>
             </a:r>
           </a:p>
           <a:p>
@@ -5862,13 +5846,8 @@
           <a:p>
             <a:r>
               <a:rPr lang="en-US" dirty="0" smtClean="0"/>
-              <a:t>Potential uses in </a:t>
-            </a:r>
-            <a:r>
-              <a:rPr lang="en-US" dirty="0" smtClean="0"/>
-              <a:t>micro-cooling</a:t>
-            </a:r>
-            <a:endParaRPr lang="en-US" dirty="0" smtClean="0"/>
+              <a:t>Potential uses in micro-cooling</a:t>
+            </a:r>
           </a:p>
           <a:p>
             <a:r>
@@ -5881,18 +5860,17 @@
             </a:r>
             <a:r>
               <a:rPr lang="en-US" dirty="0" smtClean="0"/>
-              <a:t>, </a:t>
-            </a:r>
+              <a:t>, require data on droplet kinetics</a:t>
+            </a:r>
+          </a:p>
+          <a:p>
             <a:r>
               <a:rPr lang="en-US" dirty="0" smtClean="0"/>
-              <a:t>require data on droplet kinetics</a:t>
-            </a:r>
-            <a:endParaRPr lang="en-US" dirty="0" smtClean="0"/>
-          </a:p>
-          <a:p>
+              <a:t>Collect data </a:t>
+            </a:r>
             <a:r>
               <a:rPr lang="en-US" dirty="0" smtClean="0"/>
-              <a:t>Image Processing tool to collect such data from images taken through high-speed camera</a:t>
+              <a:t>from images taken through high-speed camera</a:t>
             </a:r>
             <a:endParaRPr lang="en-US" dirty="0"/>
           </a:p>
@@ -6363,15 +6341,7 @@
           <a:p>
             <a:r>
               <a:rPr lang="en-US" dirty="0" smtClean="0"/>
-              <a:t>Start new project with OOP structure and </a:t>
-            </a:r>
-            <a:r>
-              <a:rPr lang="en-US" dirty="0" smtClean="0"/>
-              <a:t>utilize working </a:t>
-            </a:r>
-            <a:r>
-              <a:rPr lang="en-US" dirty="0" smtClean="0"/>
-              <a:t>components from Version 1</a:t>
+              <a:t>Start new project with OOP structure and utilize working components from Version 1</a:t>
             </a:r>
           </a:p>
           <a:p>
@@ -6383,15 +6353,7 @@
           <a:p>
             <a:r>
               <a:rPr lang="en-US" dirty="0" smtClean="0"/>
-              <a:t>Use </a:t>
-            </a:r>
-            <a:r>
-              <a:rPr lang="en-US" dirty="0" smtClean="0"/>
-              <a:t>multithreading </a:t>
-            </a:r>
-            <a:r>
-              <a:rPr lang="en-US" dirty="0" smtClean="0"/>
-              <a:t>to maximize processing speed</a:t>
+              <a:t>Use multithreading to maximize processing speed</a:t>
             </a:r>
           </a:p>
           <a:p>
@@ -6502,7 +6464,7 @@
           <a:blip r:embed="rId2" cstate="print">
             <a:extLst>
               <a:ext uri="{28A0092B-C50C-407E-A947-70E740481C1C}">
-                <a14:useLocalDpi xmlns:a14="http://schemas.microsoft.com/office/drawing/2010/main" val="0"/>
+                <a14:useLocalDpi xmlns:a14="http://schemas.microsoft.com/office/drawing/2010/main" xmlns="" val="0"/>
               </a:ext>
             </a:extLst>
           </a:blip>

</xml_diff>